<commit_message>
update figure coupling kratos - prob. lib
</commit_message>
<xml_diff>
--- a/sources/Deltares.Probabilistic.PWrapper.Examples/kratos/Prob Kratos DSD.pptx
+++ b/sources/Deltares.Probabilistic.PWrapper.Examples/kratos/Prob Kratos DSD.pptx
@@ -20532,8 +20532,8 @@
           </a:p>
         </p:txBody>
       </p:sp>
-      <mc:AlternateContent xmlns:mc="http://schemas.openxmlformats.org/markup-compatibility/2006">
-        <mc:Choice xmlns:a14="http://schemas.microsoft.com/office/drawing/2010/main" Requires="a14">
+      <mc:AlternateContent xmlns:mc="http://schemas.openxmlformats.org/markup-compatibility/2006" xmlns:a14="http://schemas.microsoft.com/office/drawing/2010/main">
+        <mc:Choice Requires="a14">
           <p:sp>
             <p:nvSpPr>
               <p:cNvPr id="8" name="TextBox 7">
@@ -20562,6 +20562,7 @@
               </a:bodyPr>
               <a:lstStyle/>
               <a:p>
+                <a:pPr/>
                 <a14:m>
                   <m:oMathPara xmlns:m="http://schemas.openxmlformats.org/officeDocument/2006/math">
                     <m:oMathParaPr>
@@ -20650,7 +20651,7 @@
             </p:txBody>
           </p:sp>
         </mc:Choice>
-        <mc:Fallback>
+        <mc:Fallback xmlns="">
           <p:sp>
             <p:nvSpPr>
               <p:cNvPr id="8" name="TextBox 7">
@@ -20695,8 +20696,8 @@
           </p:sp>
         </mc:Fallback>
       </mc:AlternateContent>
-      <mc:AlternateContent xmlns:mc="http://schemas.openxmlformats.org/markup-compatibility/2006">
-        <mc:Choice xmlns:a14="http://schemas.microsoft.com/office/drawing/2010/main" Requires="a14">
+      <mc:AlternateContent xmlns:mc="http://schemas.openxmlformats.org/markup-compatibility/2006" xmlns:a14="http://schemas.microsoft.com/office/drawing/2010/main">
+        <mc:Choice Requires="a14">
           <p:sp>
             <p:nvSpPr>
               <p:cNvPr id="9" name="TextBox 8">
@@ -20725,6 +20726,7 @@
               </a:bodyPr>
               <a:lstStyle/>
               <a:p>
+                <a:pPr/>
                 <a14:m>
                   <m:oMathPara xmlns:m="http://schemas.openxmlformats.org/officeDocument/2006/math">
                     <m:oMathParaPr>
@@ -20813,7 +20815,7 @@
             </p:txBody>
           </p:sp>
         </mc:Choice>
-        <mc:Fallback>
+        <mc:Fallback xmlns="">
           <p:sp>
             <p:nvSpPr>
               <p:cNvPr id="9" name="TextBox 8">
@@ -20858,8 +20860,8 @@
           </p:sp>
         </mc:Fallback>
       </mc:AlternateContent>
-      <mc:AlternateContent xmlns:mc="http://schemas.openxmlformats.org/markup-compatibility/2006">
-        <mc:Choice xmlns:a14="http://schemas.microsoft.com/office/drawing/2010/main" Requires="a14">
+      <mc:AlternateContent xmlns:mc="http://schemas.openxmlformats.org/markup-compatibility/2006" xmlns:a14="http://schemas.microsoft.com/office/drawing/2010/main">
+        <mc:Choice Requires="a14">
           <p:sp>
             <p:nvSpPr>
               <p:cNvPr id="10" name="TextBox 9">
@@ -20888,6 +20890,7 @@
               </a:bodyPr>
               <a:lstStyle/>
               <a:p>
+                <a:pPr/>
                 <a14:m>
                   <m:oMathPara xmlns:m="http://schemas.openxmlformats.org/officeDocument/2006/math">
                     <m:oMathParaPr>
@@ -21034,7 +21037,7 @@
             </p:txBody>
           </p:sp>
         </mc:Choice>
-        <mc:Fallback>
+        <mc:Fallback xmlns="">
           <p:sp>
             <p:nvSpPr>
               <p:cNvPr id="10" name="TextBox 9">
@@ -21079,8 +21082,8 @@
           </p:sp>
         </mc:Fallback>
       </mc:AlternateContent>
-      <mc:AlternateContent xmlns:mc="http://schemas.openxmlformats.org/markup-compatibility/2006">
-        <mc:Choice xmlns:a14="http://schemas.microsoft.com/office/drawing/2010/main" Requires="a14">
+      <mc:AlternateContent xmlns:mc="http://schemas.openxmlformats.org/markup-compatibility/2006" xmlns:a14="http://schemas.microsoft.com/office/drawing/2010/main">
+        <mc:Choice Requires="a14">
           <p:sp>
             <p:nvSpPr>
               <p:cNvPr id="12" name="TextBox 11">
@@ -21109,6 +21112,7 @@
               </a:bodyPr>
               <a:lstStyle/>
               <a:p>
+                <a:pPr/>
                 <a14:m>
                   <m:oMathPara xmlns:m="http://schemas.openxmlformats.org/officeDocument/2006/math">
                     <m:oMathParaPr>
@@ -21337,7 +21341,7 @@
             </p:txBody>
           </p:sp>
         </mc:Choice>
-        <mc:Fallback>
+        <mc:Fallback xmlns="">
           <p:sp>
             <p:nvSpPr>
               <p:cNvPr id="12" name="TextBox 11">
@@ -22006,6 +22010,16 @@
               <a:t> (damwand)</a:t>
             </a:r>
           </a:p>
+          <a:p>
+            <a:pPr lvl="1"/>
+            <a:r>
+              <a:rPr lang="nl-NL" dirty="0"/>
+              <a:t>Inclusief voorbeeld bewezen sterkte</a:t>
+            </a:r>
+          </a:p>
+          <a:p>
+            <a:endParaRPr lang="nl-NL" dirty="0"/>
+          </a:p>
         </p:txBody>
       </p:sp>
       <p:sp>
@@ -23138,6 +23152,36 @@
           <a:chExt cx="0" cy="0"/>
         </a:xfrm>
       </p:grpSpPr>
+      <p:pic>
+        <p:nvPicPr>
+          <p:cNvPr id="10" name="Picture 9">
+            <a:extLst>
+              <a:ext uri="{FF2B5EF4-FFF2-40B4-BE49-F238E27FC236}">
+                <a16:creationId xmlns:a16="http://schemas.microsoft.com/office/drawing/2014/main" id="{74FF655D-822E-1C21-2807-27D2C10A6BBE}"/>
+              </a:ext>
+            </a:extLst>
+          </p:cNvPr>
+          <p:cNvPicPr>
+            <a:picLocks noChangeAspect="1"/>
+          </p:cNvPicPr>
+          <p:nvPr/>
+        </p:nvPicPr>
+        <p:blipFill>
+          <a:blip r:embed="rId2"/>
+          <a:stretch>
+            <a:fillRect/>
+          </a:stretch>
+        </p:blipFill>
+        <p:spPr>
+          <a:xfrm>
+            <a:off x="4831291" y="2639513"/>
+            <a:ext cx="1790950" cy="1143160"/>
+          </a:xfrm>
+          <a:prstGeom prst="rect">
+            <a:avLst/>
+          </a:prstGeom>
+        </p:spPr>
+      </p:pic>
       <p:sp>
         <p:nvSpPr>
           <p:cNvPr id="2" name="Title 1">
@@ -23161,7 +23205,14 @@
           <a:p>
             <a:r>
               <a:rPr lang="nl-NL" dirty="0"/>
-              <a:t>Damwand model</a:t>
+              <a:t>Damwand model gekoppeld aan</a:t>
+            </a:r>
+            <a:br>
+              <a:rPr lang="nl-NL" dirty="0"/>
+            </a:br>
+            <a:r>
+              <a:rPr lang="nl-NL" dirty="0"/>
+              <a:t>probabilistische bibliotheek</a:t>
             </a:r>
           </a:p>
         </p:txBody>
@@ -23516,7 +23567,7 @@
         </p:nvCxnSpPr>
         <p:spPr>
           <a:xfrm flipH="1">
-            <a:off x="5200835" y="3462291"/>
+            <a:off x="5200834" y="3508588"/>
             <a:ext cx="1228537" cy="0"/>
           </a:xfrm>
           <a:prstGeom prst="straightConnector1">
@@ -23590,7 +23641,7 @@
         </p:nvSpPr>
         <p:spPr>
           <a:xfrm>
-            <a:off x="5389776" y="3103139"/>
+            <a:off x="5432044" y="3508588"/>
             <a:ext cx="877163" cy="369332"/>
           </a:xfrm>
           <a:prstGeom prst="rect">
@@ -26610,15 +26661,6 @@
 </file>
 
 <file path=customXml/item1.xml><?xml version="1.0" encoding="utf-8"?>
-<?mso-contentType ?>
-<FormTemplates xmlns="http://schemas.microsoft.com/sharepoint/v3/contenttype/forms">
-  <Display>DocumentLibraryForm</Display>
-  <Edit>DocumentLibraryForm</Edit>
-  <New>DocumentLibraryForm</New>
-</FormTemplates>
-</file>
-
-<file path=customXml/item2.xml><?xml version="1.0" encoding="utf-8"?>
 <p:properties xmlns:p="http://schemas.microsoft.com/office/2006/metadata/properties" xmlns:xsi="http://www.w3.org/2001/XMLSchema-instance" xmlns:pc="http://schemas.microsoft.com/office/infopath/2007/PartnerControls">
   <documentManagement>
     <TaxCatchAll xmlns="dead17b3-d09a-4d17-9633-982b423f4fbc" xsi:nil="true"/>
@@ -26627,6 +26669,15 @@
     </lcf76f155ced4ddcb4097134ff3c332f>
   </documentManagement>
 </p:properties>
+</file>
+
+<file path=customXml/item2.xml><?xml version="1.0" encoding="utf-8"?>
+<?mso-contentType ?>
+<FormTemplates xmlns="http://schemas.microsoft.com/sharepoint/v3/contenttype/forms">
+  <Display>DocumentLibraryForm</Display>
+  <Edit>DocumentLibraryForm</Edit>
+  <New>DocumentLibraryForm</New>
+</FormTemplates>
 </file>
 
 <file path=customXml/item3.xml><?xml version="1.0" encoding="utf-8"?>
@@ -26841,20 +26892,20 @@
 </file>
 
 <file path=customXml/itemProps1.xml><?xml version="1.0" encoding="utf-8"?>
-<ds:datastoreItem xmlns:ds="http://schemas.openxmlformats.org/officeDocument/2006/customXml" ds:itemID="{5636F5E9-25BB-4734-86C2-FD32BCBA5CBD}">
-  <ds:schemaRefs>
-    <ds:schemaRef ds:uri="http://schemas.microsoft.com/sharepoint/v3/contenttype/forms"/>
-  </ds:schemaRefs>
-</ds:datastoreItem>
-</file>
-
-<file path=customXml/itemProps2.xml><?xml version="1.0" encoding="utf-8"?>
 <ds:datastoreItem xmlns:ds="http://schemas.openxmlformats.org/officeDocument/2006/customXml" ds:itemID="{84338BAD-8BA4-4C42-A850-147A5D210631}">
   <ds:schemaRefs>
     <ds:schemaRef ds:uri="http://schemas.microsoft.com/office/2006/metadata/properties"/>
     <ds:schemaRef ds:uri="http://schemas.microsoft.com/office/infopath/2007/PartnerControls"/>
     <ds:schemaRef ds:uri="dead17b3-d09a-4d17-9633-982b423f4fbc"/>
     <ds:schemaRef ds:uri="edd774d5-6d8f-4b83-b098-255576e86aac"/>
+  </ds:schemaRefs>
+</ds:datastoreItem>
+</file>
+
+<file path=customXml/itemProps2.xml><?xml version="1.0" encoding="utf-8"?>
+<ds:datastoreItem xmlns:ds="http://schemas.openxmlformats.org/officeDocument/2006/customXml" ds:itemID="{5636F5E9-25BB-4734-86C2-FD32BCBA5CBD}">
+  <ds:schemaRefs>
+    <ds:schemaRef ds:uri="http://schemas.microsoft.com/sharepoint/v3/contenttype/forms"/>
   </ds:schemaRefs>
 </ds:datastoreItem>
 </file>

</xml_diff>